<commit_message>
Edits to the slides
</commit_message>
<xml_diff>
--- a/Presentation/FinalPresentation_Template.pptx
+++ b/Presentation/FinalPresentation_Template.pptx
@@ -111,6 +111,11 @@
       </a:defRPr>
     </a:lvl9pPr>
   </p:defaultTextStyle>
+  <p:extLst>
+    <p:ext uri="{EFAFB233-063F-42B5-8137-9DF3F51BA10A}">
+      <p15:sldGuideLst xmlns:p15="http://schemas.microsoft.com/office/powerpoint/2012/main"/>
+    </p:ext>
+  </p:extLst>
 </p:presentation>
 </file>
 
@@ -6983,7 +6988,7 @@
           <a:lstStyle/>
           <a:p>
             <a:r>
-              <a:rPr lang="en-US" sz="1800">
+              <a:rPr lang="en-US" sz="1800" dirty="0">
                 <a:solidFill>
                   <a:schemeClr val="tx2"/>
                 </a:solidFill>
@@ -6993,27 +6998,83 @@
           </a:p>
           <a:p>
             <a:r>
-              <a:rPr lang="en-US" sz="1800">
+              <a:rPr lang="en-US" sz="1800" dirty="0">
                 <a:solidFill>
                   <a:schemeClr val="tx2"/>
                 </a:solidFill>
               </a:rPr>
-              <a:t>Nodes: genes, variants, cancer_types, histological data, drug targets, pathways</a:t>
+              <a:t>Nodes: genes, variants, </a:t>
             </a:r>
-          </a:p>
-          <a:p>
+            <a:r>
+              <a:rPr lang="en-US" sz="1800" dirty="0" err="1">
+                <a:solidFill>
+                  <a:schemeClr val="tx2"/>
+                </a:solidFill>
+              </a:rPr>
+              <a:t>cancer_types</a:t>
+            </a:r>
+            <a:r>
+              <a:rPr lang="en-US" sz="1800" dirty="0">
+                <a:solidFill>
+                  <a:schemeClr val="tx2"/>
+                </a:solidFill>
+              </a:rPr>
+              <a:t>, histological data, drug targets, pathways</a:t>
+            </a:r>
+          </a:p>
+          <a:p>
+            <a:r>
+              <a:rPr lang="en-US" sz="1800" dirty="0" err="1">
+                <a:solidFill>
+                  <a:schemeClr val="tx2"/>
+                </a:solidFill>
+              </a:rPr>
+              <a:t>Edges:</a:t>
+            </a:r>
+            <a:r>
+              <a:rPr lang="en-US" sz="1800" err="1">
+                <a:solidFill>
+                  <a:schemeClr val="tx2"/>
+                </a:solidFill>
+              </a:rPr>
+              <a:t>gene</a:t>
+            </a:r>
             <a:r>
               <a:rPr lang="en-US" sz="1800">
                 <a:solidFill>
                   <a:schemeClr val="tx2"/>
                 </a:solidFill>
               </a:rPr>
-              <a:t>Edges: HAS_VARIANT, ASSOCIATED_WITH_PATHWAY, TARGETED_BY_DRUG (more tbd)</a:t>
+              <a:t>_has_variant_src, </a:t>
             </a:r>
-          </a:p>
-          <a:p>
             <a:r>
-              <a:rPr lang="en-US" sz="1800">
+              <a:rPr lang="en-US" sz="1800" dirty="0">
+                <a:solidFill>
+                  <a:schemeClr val="tx2"/>
+                </a:solidFill>
+              </a:rPr>
+              <a:t>ASSOCIATED_WITH_PATHWAY, TARGETED_BY_DRUG (more </a:t>
+            </a:r>
+            <a:r>
+              <a:rPr lang="en-US" sz="1800" dirty="0" err="1">
+                <a:solidFill>
+                  <a:schemeClr val="tx2"/>
+                </a:solidFill>
+              </a:rPr>
+              <a:t>tbd</a:t>
+            </a:r>
+            <a:r>
+              <a:rPr lang="en-US" sz="1800" dirty="0">
+                <a:solidFill>
+                  <a:schemeClr val="tx2"/>
+                </a:solidFill>
+              </a:rPr>
+              <a:t>)</a:t>
+            </a:r>
+          </a:p>
+          <a:p>
+            <a:r>
+              <a:rPr lang="en-US" sz="1800" dirty="0">
                 <a:solidFill>
                   <a:schemeClr val="tx2"/>
                 </a:solidFill>

</xml_diff>

<commit_message>
Cleaning up and adding updated slides
</commit_message>
<xml_diff>
--- a/Presentation/FinalPresentation_Template.pptx
+++ b/Presentation/FinalPresentation_Template.pptx
@@ -18,14 +18,15 @@
     <p:sldId id="263" r:id="rId13"/>
     <p:sldId id="264" r:id="rId14"/>
     <p:sldId id="265" r:id="rId15"/>
+    <p:sldId id="266" r:id="rId16"/>
   </p:sldIdLst>
   <p:sldSz cy="6858000" cx="12192000"/>
   <p:notesSz cx="6858000" cy="9144000"/>
   <p:embeddedFontLst>
     <p:embeddedFont>
       <p:font typeface="Play"/>
-      <p:regular r:id="rId16"/>
-      <p:bold r:id="rId17"/>
+      <p:regular r:id="rId17"/>
+      <p:bold r:id="rId18"/>
     </p:embeddedFont>
   </p:embeddedFontLst>
   <p:defaultTextStyle>
@@ -259,7 +260,7 @@
   </p:defaultTextStyle>
   <p:extLst>
     <p:ext uri="GoogleSlidesCustomDataVersion2">
-      <go:slidesCustomData xmlns:go="http://customooxmlschemas.google.com/" r:id="rId18" roundtripDataSignature="AMtx7mgoLJHgykbmnSjR0jwQK0YEB4XYFw=="/>
+      <go:slidesCustomData xmlns:go="http://customooxmlschemas.google.com/" r:id="rId19" roundtripDataSignature="AMtx7miID0FH45g1adVMdhFmGP5TFq0XyQ=="/>
     </p:ext>
   </p:extLst>
 </p:presentation>
@@ -818,7 +819,7 @@
   <p:cSld>
     <p:spTree>
       <p:nvGrpSpPr>
-        <p:cNvPr id="162" name="Shape 162"/>
+        <p:cNvPr id="168" name="Shape 168"/>
         <p:cNvGrpSpPr/>
         <p:nvPr/>
       </p:nvGrpSpPr>
@@ -832,7 +833,7 @@
       </p:grpSpPr>
       <p:sp>
         <p:nvSpPr>
-          <p:cNvPr id="163" name="Google Shape;163;p8:notes"/>
+          <p:cNvPr id="169" name="Google Shape;169;p7:notes"/>
           <p:cNvSpPr txBox="1"/>
           <p:nvPr>
             <p:ph idx="1" type="body"/>
@@ -871,7 +872,106 @@
       </p:sp>
       <p:sp>
         <p:nvSpPr>
-          <p:cNvPr id="164" name="Google Shape;164;p8:notes"/>
+          <p:cNvPr id="170" name="Google Shape;170;p7:notes"/>
+          <p:cNvSpPr/>
+          <p:nvPr>
+            <p:ph idx="2" type="sldImg"/>
+          </p:nvPr>
+        </p:nvSpPr>
+        <p:spPr>
+          <a:xfrm>
+            <a:off x="1143225" y="685800"/>
+            <a:ext cx="4572225" cy="3429000"/>
+          </a:xfrm>
+          <a:custGeom>
+            <a:rect b="b" l="l" r="r" t="t"/>
+            <a:pathLst>
+              <a:path extrusionOk="0" h="120000" w="120000">
+                <a:moveTo>
+                  <a:pt x="0" y="0"/>
+                </a:moveTo>
+                <a:lnTo>
+                  <a:pt x="120000" y="0"/>
+                </a:lnTo>
+                <a:lnTo>
+                  <a:pt x="120000" y="120000"/>
+                </a:lnTo>
+                <a:lnTo>
+                  <a:pt x="0" y="120000"/>
+                </a:lnTo>
+                <a:close/>
+              </a:path>
+            </a:pathLst>
+          </a:custGeom>
+        </p:spPr>
+      </p:sp>
+    </p:spTree>
+  </p:cSld>
+  <p:clrMapOvr>
+    <a:masterClrMapping/>
+  </p:clrMapOvr>
+</p:notes>
+</file>
+
+<file path=ppt/notesSlides/notesSlide11.xml><?xml version="1.0" encoding="utf-8"?>
+<p:notes xmlns:a="http://schemas.openxmlformats.org/drawingml/2006/main" xmlns:r="http://schemas.openxmlformats.org/officeDocument/2006/relationships" xmlns:mc="http://schemas.openxmlformats.org/markup-compatibility/2006" xmlns:mv="urn:schemas-microsoft-com:mac:vml" xmlns:p="http://schemas.openxmlformats.org/presentationml/2006/main" xmlns:c="http://schemas.openxmlformats.org/drawingml/2006/chart" xmlns:dgm="http://schemas.openxmlformats.org/drawingml/2006/diagram" xmlns:o="urn:schemas-microsoft-com:office:office" xmlns:v="urn:schemas-microsoft-com:vml" xmlns:pvml="urn:schemas-microsoft-com:office:powerpoint" xmlns:com="http://schemas.openxmlformats.org/drawingml/2006/compatibility" xmlns:p14="http://schemas.microsoft.com/office/powerpoint/2010/main" xmlns:p15="http://schemas.microsoft.com/office/powerpoint/2012/main" xmlns:ahyp="http://schemas.microsoft.com/office/drawing/2018/hyperlinkcolor" showMasterPhAnim="0" showMasterSp="0">
+  <p:cSld>
+    <p:spTree>
+      <p:nvGrpSpPr>
+        <p:cNvPr id="174" name="Shape 174"/>
+        <p:cNvGrpSpPr/>
+        <p:nvPr/>
+      </p:nvGrpSpPr>
+      <p:grpSpPr>
+        <a:xfrm>
+          <a:off x="0" y="0"/>
+          <a:ext cx="0" cy="0"/>
+          <a:chOff x="0" y="0"/>
+          <a:chExt cx="0" cy="0"/>
+        </a:xfrm>
+      </p:grpSpPr>
+      <p:sp>
+        <p:nvSpPr>
+          <p:cNvPr id="175" name="Google Shape;175;p8:notes"/>
+          <p:cNvSpPr txBox="1"/>
+          <p:nvPr>
+            <p:ph idx="1" type="body"/>
+          </p:nvPr>
+        </p:nvSpPr>
+        <p:spPr>
+          <a:xfrm>
+            <a:off x="685800" y="4343400"/>
+            <a:ext cx="5486400" cy="4114800"/>
+          </a:xfrm>
+          <a:prstGeom prst="rect">
+            <a:avLst/>
+          </a:prstGeom>
+        </p:spPr>
+        <p:txBody>
+          <a:bodyPr anchorCtr="0" anchor="t" bIns="91425" lIns="91425" spcFirstLastPara="1" rIns="91425" wrap="square" tIns="91425">
+            <a:noAutofit/>
+          </a:bodyPr>
+          <a:lstStyle/>
+          <a:p>
+            <a:pPr indent="0" lvl="0" marL="0" rtl="0" algn="l">
+              <a:spcBef>
+                <a:spcPts val="0"/>
+              </a:spcBef>
+              <a:spcAft>
+                <a:spcPts val="0"/>
+              </a:spcAft>
+              <a:buNone/>
+            </a:pPr>
+            <a:r>
+              <a:t/>
+            </a:r>
+            <a:endParaRPr/>
+          </a:p>
+        </p:txBody>
+      </p:sp>
+      <p:sp>
+        <p:nvSpPr>
+          <p:cNvPr id="176" name="Google Shape;176;p8:notes"/>
           <p:cNvSpPr/>
           <p:nvPr>
             <p:ph idx="2" type="sldImg"/>
@@ -1426,7 +1526,7 @@
       </p:grpSpPr>
       <p:sp>
         <p:nvSpPr>
-          <p:cNvPr id="143" name="Google Shape;143;g388e2ef6367_0_4:notes"/>
+          <p:cNvPr id="143" name="Google Shape;143;g388e2ef6367_9_13:notes"/>
           <p:cNvSpPr/>
           <p:nvPr>
             <p:ph idx="2" type="sldImg"/>
@@ -1461,7 +1561,7 @@
       </p:sp>
       <p:sp>
         <p:nvSpPr>
-          <p:cNvPr id="144" name="Google Shape;144;g388e2ef6367_0_4:notes"/>
+          <p:cNvPr id="144" name="Google Shape;144;g388e2ef6367_9_13:notes"/>
           <p:cNvSpPr txBox="1"/>
           <p:nvPr>
             <p:ph idx="1" type="body"/>
@@ -1489,6 +1589,195 @@
               <a:spcAft>
                 <a:spcPts val="0"/>
               </a:spcAft>
+              <a:buClr>
+                <a:schemeClr val="dk1"/>
+              </a:buClr>
+              <a:buSzPts val="1100"/>
+              <a:buFont typeface="Arial"/>
+              <a:buNone/>
+            </a:pPr>
+            <a:r>
+              <a:rPr i="1" lang="en-US">
+                <a:solidFill>
+                  <a:schemeClr val="dk1"/>
+                </a:solidFill>
+              </a:rPr>
+              <a:t>This query focuses on the pathway </a:t>
+            </a:r>
+            <a:r>
+              <a:rPr b="1" i="1" lang="en-US">
+                <a:solidFill>
+                  <a:schemeClr val="dk1"/>
+                </a:solidFill>
+              </a:rPr>
+              <a:t>Oncogene Induced Senescence</a:t>
+            </a:r>
+            <a:r>
+              <a:rPr i="1" lang="en-US">
+                <a:solidFill>
+                  <a:schemeClr val="dk1"/>
+                </a:solidFill>
+              </a:rPr>
+              <a:t> in melanoma.</a:t>
+            </a:r>
+            <a:br>
+              <a:rPr i="1" lang="en-US">
+                <a:solidFill>
+                  <a:schemeClr val="dk1"/>
+                </a:solidFill>
+              </a:rPr>
+            </a:br>
+            <a:endParaRPr i="1">
+              <a:solidFill>
+                <a:schemeClr val="dk1"/>
+              </a:solidFill>
+            </a:endParaRPr>
+          </a:p>
+          <a:p>
+            <a:pPr indent="0" lvl="0" marL="0" rtl="0" algn="l">
+              <a:spcBef>
+                <a:spcPts val="0"/>
+              </a:spcBef>
+              <a:spcAft>
+                <a:spcPts val="0"/>
+              </a:spcAft>
+              <a:buClr>
+                <a:schemeClr val="dk1"/>
+              </a:buClr>
+              <a:buSzPts val="1100"/>
+              <a:buFont typeface="Arial"/>
+              <a:buNone/>
+            </a:pPr>
+            <a:r>
+              <a:rPr i="1" lang="en-US">
+                <a:solidFill>
+                  <a:schemeClr val="dk1"/>
+                </a:solidFill>
+              </a:rPr>
+              <a:t>Senescence is a natural tumor-suppressive mechanism, and when it fails, melanoma progresses.</a:t>
+            </a:r>
+            <a:br>
+              <a:rPr i="1" lang="en-US">
+                <a:solidFill>
+                  <a:schemeClr val="dk1"/>
+                </a:solidFill>
+              </a:rPr>
+            </a:br>
+            <a:endParaRPr i="1">
+              <a:solidFill>
+                <a:schemeClr val="dk1"/>
+              </a:solidFill>
+            </a:endParaRPr>
+          </a:p>
+          <a:p>
+            <a:pPr indent="0" lvl="0" marL="0" rtl="0" algn="l">
+              <a:spcBef>
+                <a:spcPts val="0"/>
+              </a:spcBef>
+              <a:spcAft>
+                <a:spcPts val="0"/>
+              </a:spcAft>
+              <a:buClr>
+                <a:schemeClr val="dk1"/>
+              </a:buClr>
+              <a:buSzPts val="1100"/>
+              <a:buFont typeface="Arial"/>
+              <a:buNone/>
+            </a:pPr>
+            <a:r>
+              <a:rPr i="1" lang="en-US">
+                <a:solidFill>
+                  <a:schemeClr val="dk1"/>
+                </a:solidFill>
+              </a:rPr>
+              <a:t>By mapping the genes in this pathway, we can identify molecular targets that could restore or bypass senescence.</a:t>
+            </a:r>
+            <a:br>
+              <a:rPr i="1" lang="en-US">
+                <a:solidFill>
+                  <a:schemeClr val="dk1"/>
+                </a:solidFill>
+              </a:rPr>
+            </a:br>
+            <a:endParaRPr i="1">
+              <a:solidFill>
+                <a:schemeClr val="dk1"/>
+              </a:solidFill>
+            </a:endParaRPr>
+          </a:p>
+          <a:p>
+            <a:pPr indent="0" lvl="0" marL="0" rtl="0" algn="l">
+              <a:spcBef>
+                <a:spcPts val="0"/>
+              </a:spcBef>
+              <a:spcAft>
+                <a:spcPts val="0"/>
+              </a:spcAft>
+              <a:buClr>
+                <a:schemeClr val="dk1"/>
+              </a:buClr>
+              <a:buSzPts val="1100"/>
+              <a:buFont typeface="Arial"/>
+              <a:buNone/>
+            </a:pPr>
+            <a:r>
+              <a:rPr i="1" lang="en-US">
+                <a:solidFill>
+                  <a:schemeClr val="dk1"/>
+                </a:solidFill>
+              </a:rPr>
+              <a:t>When we connect these targets to drugs, we immediately see opportunities for repurposing existing therapies, designing new combinations, and uncovering completely new points of intervention.</a:t>
+            </a:r>
+            <a:br>
+              <a:rPr i="1" lang="en-US">
+                <a:solidFill>
+                  <a:schemeClr val="dk1"/>
+                </a:solidFill>
+              </a:rPr>
+            </a:br>
+            <a:endParaRPr i="1">
+              <a:solidFill>
+                <a:schemeClr val="dk1"/>
+              </a:solidFill>
+            </a:endParaRPr>
+          </a:p>
+          <a:p>
+            <a:pPr indent="0" lvl="0" marL="0" rtl="0" algn="l">
+              <a:spcBef>
+                <a:spcPts val="0"/>
+              </a:spcBef>
+              <a:spcAft>
+                <a:spcPts val="0"/>
+              </a:spcAft>
+              <a:buClr>
+                <a:schemeClr val="dk1"/>
+              </a:buClr>
+              <a:buSzPts val="1100"/>
+              <a:buFont typeface="Arial"/>
+              <a:buNone/>
+            </a:pPr>
+            <a:r>
+              <a:rPr i="1" lang="en-US">
+                <a:solidFill>
+                  <a:schemeClr val="dk1"/>
+                </a:solidFill>
+              </a:rPr>
+              <a:t>This pathway-centric view is powerful for drug discovery, because it links disease biology directly to therapeutic options.</a:t>
+            </a:r>
+            <a:endParaRPr i="1">
+              <a:solidFill>
+                <a:schemeClr val="dk1"/>
+              </a:solidFill>
+            </a:endParaRPr>
+          </a:p>
+          <a:p>
+            <a:pPr indent="0" lvl="0" marL="0" rtl="0" algn="l">
+              <a:spcBef>
+                <a:spcPts val="0"/>
+              </a:spcBef>
+              <a:spcAft>
+                <a:spcPts val="0"/>
+              </a:spcAft>
               <a:buNone/>
             </a:pPr>
             <a:r>
@@ -1511,7 +1800,7 @@
   <p:cSld>
     <p:spTree>
       <p:nvGrpSpPr>
-        <p:cNvPr id="149" name="Shape 149"/>
+        <p:cNvPr id="152" name="Shape 152"/>
         <p:cNvGrpSpPr/>
         <p:nvPr/>
       </p:nvGrpSpPr>
@@ -1525,7 +1814,7 @@
       </p:grpSpPr>
       <p:sp>
         <p:nvSpPr>
-          <p:cNvPr id="150" name="Google Shape;150;g388e2ef6367_9_3:notes"/>
+          <p:cNvPr id="153" name="Google Shape;153;g388e2ef6367_0_11:notes"/>
           <p:cNvSpPr/>
           <p:nvPr>
             <p:ph idx="2" type="sldImg"/>
@@ -1560,7 +1849,106 @@
       </p:sp>
       <p:sp>
         <p:nvSpPr>
-          <p:cNvPr id="151" name="Google Shape;151;g388e2ef6367_9_3:notes"/>
+          <p:cNvPr id="154" name="Google Shape;154;g388e2ef6367_0_11:notes"/>
+          <p:cNvSpPr txBox="1"/>
+          <p:nvPr>
+            <p:ph idx="1" type="body"/>
+          </p:nvPr>
+        </p:nvSpPr>
+        <p:spPr>
+          <a:xfrm>
+            <a:off x="685800" y="4343400"/>
+            <a:ext cx="5486400" cy="4114800"/>
+          </a:xfrm>
+          <a:prstGeom prst="rect">
+            <a:avLst/>
+          </a:prstGeom>
+        </p:spPr>
+        <p:txBody>
+          <a:bodyPr anchorCtr="0" anchor="t" bIns="91425" lIns="91425" spcFirstLastPara="1" rIns="91425" wrap="square" tIns="91425">
+            <a:noAutofit/>
+          </a:bodyPr>
+          <a:lstStyle/>
+          <a:p>
+            <a:pPr indent="0" lvl="0" marL="0" rtl="0" algn="l">
+              <a:spcBef>
+                <a:spcPts val="0"/>
+              </a:spcBef>
+              <a:spcAft>
+                <a:spcPts val="0"/>
+              </a:spcAft>
+              <a:buNone/>
+            </a:pPr>
+            <a:r>
+              <a:t/>
+            </a:r>
+            <a:endParaRPr/>
+          </a:p>
+        </p:txBody>
+      </p:sp>
+    </p:spTree>
+  </p:cSld>
+  <p:clrMapOvr>
+    <a:masterClrMapping/>
+  </p:clrMapOvr>
+</p:notes>
+</file>
+
+<file path=ppt/notesSlides/notesSlide9.xml><?xml version="1.0" encoding="utf-8"?>
+<p:notes xmlns:a="http://schemas.openxmlformats.org/drawingml/2006/main" xmlns:r="http://schemas.openxmlformats.org/officeDocument/2006/relationships" xmlns:mc="http://schemas.openxmlformats.org/markup-compatibility/2006" xmlns:mv="urn:schemas-microsoft-com:mac:vml" xmlns:p="http://schemas.openxmlformats.org/presentationml/2006/main" xmlns:c="http://schemas.openxmlformats.org/drawingml/2006/chart" xmlns:dgm="http://schemas.openxmlformats.org/drawingml/2006/diagram" xmlns:o="urn:schemas-microsoft-com:office:office" xmlns:v="urn:schemas-microsoft-com:vml" xmlns:pvml="urn:schemas-microsoft-com:office:powerpoint" xmlns:com="http://schemas.openxmlformats.org/drawingml/2006/compatibility" xmlns:p14="http://schemas.microsoft.com/office/powerpoint/2010/main" xmlns:p15="http://schemas.microsoft.com/office/powerpoint/2012/main" xmlns:ahyp="http://schemas.microsoft.com/office/drawing/2018/hyperlinkcolor" showMasterPhAnim="0" showMasterSp="0">
+  <p:cSld>
+    <p:spTree>
+      <p:nvGrpSpPr>
+        <p:cNvPr id="160" name="Shape 160"/>
+        <p:cNvGrpSpPr/>
+        <p:nvPr/>
+      </p:nvGrpSpPr>
+      <p:grpSpPr>
+        <a:xfrm>
+          <a:off x="0" y="0"/>
+          <a:ext cx="0" cy="0"/>
+          <a:chOff x="0" y="0"/>
+          <a:chExt cx="0" cy="0"/>
+        </a:xfrm>
+      </p:grpSpPr>
+      <p:sp>
+        <p:nvSpPr>
+          <p:cNvPr id="161" name="Google Shape;161;g388e2ef6367_9_3:notes"/>
+          <p:cNvSpPr/>
+          <p:nvPr>
+            <p:ph idx="2" type="sldImg"/>
+          </p:nvPr>
+        </p:nvSpPr>
+        <p:spPr>
+          <a:xfrm>
+            <a:off x="1143225" y="685800"/>
+            <a:ext cx="4572300" cy="3429000"/>
+          </a:xfrm>
+          <a:custGeom>
+            <a:rect b="b" l="l" r="r" t="t"/>
+            <a:pathLst>
+              <a:path extrusionOk="0" h="120000" w="120000">
+                <a:moveTo>
+                  <a:pt x="0" y="0"/>
+                </a:moveTo>
+                <a:lnTo>
+                  <a:pt x="120000" y="0"/>
+                </a:lnTo>
+                <a:lnTo>
+                  <a:pt x="120000" y="120000"/>
+                </a:lnTo>
+                <a:lnTo>
+                  <a:pt x="0" y="120000"/>
+                </a:lnTo>
+                <a:close/>
+              </a:path>
+            </a:pathLst>
+          </a:custGeom>
+        </p:spPr>
+      </p:sp>
+      <p:sp>
+        <p:nvSpPr>
+          <p:cNvPr id="162" name="Google Shape;162;g388e2ef6367_9_3:notes"/>
           <p:cNvSpPr txBox="1"/>
           <p:nvPr>
             <p:ph idx="1" type="body"/>
@@ -1989,105 +2377,6 @@
             <a:endParaRPr/>
           </a:p>
         </p:txBody>
-      </p:sp>
-    </p:spTree>
-  </p:cSld>
-  <p:clrMapOvr>
-    <a:masterClrMapping/>
-  </p:clrMapOvr>
-</p:notes>
-</file>
-
-<file path=ppt/notesSlides/notesSlide9.xml><?xml version="1.0" encoding="utf-8"?>
-<p:notes xmlns:a="http://schemas.openxmlformats.org/drawingml/2006/main" xmlns:r="http://schemas.openxmlformats.org/officeDocument/2006/relationships" xmlns:mc="http://schemas.openxmlformats.org/markup-compatibility/2006" xmlns:mv="urn:schemas-microsoft-com:mac:vml" xmlns:p="http://schemas.openxmlformats.org/presentationml/2006/main" xmlns:c="http://schemas.openxmlformats.org/drawingml/2006/chart" xmlns:dgm="http://schemas.openxmlformats.org/drawingml/2006/diagram" xmlns:o="urn:schemas-microsoft-com:office:office" xmlns:v="urn:schemas-microsoft-com:vml" xmlns:pvml="urn:schemas-microsoft-com:office:powerpoint" xmlns:com="http://schemas.openxmlformats.org/drawingml/2006/compatibility" xmlns:p14="http://schemas.microsoft.com/office/powerpoint/2010/main" xmlns:p15="http://schemas.microsoft.com/office/powerpoint/2012/main" xmlns:ahyp="http://schemas.microsoft.com/office/drawing/2018/hyperlinkcolor" showMasterPhAnim="0" showMasterSp="0">
-  <p:cSld>
-    <p:spTree>
-      <p:nvGrpSpPr>
-        <p:cNvPr id="156" name="Shape 156"/>
-        <p:cNvGrpSpPr/>
-        <p:nvPr/>
-      </p:nvGrpSpPr>
-      <p:grpSpPr>
-        <a:xfrm>
-          <a:off x="0" y="0"/>
-          <a:ext cx="0" cy="0"/>
-          <a:chOff x="0" y="0"/>
-          <a:chExt cx="0" cy="0"/>
-        </a:xfrm>
-      </p:grpSpPr>
-      <p:sp>
-        <p:nvSpPr>
-          <p:cNvPr id="157" name="Google Shape;157;p7:notes"/>
-          <p:cNvSpPr txBox="1"/>
-          <p:nvPr>
-            <p:ph idx="1" type="body"/>
-          </p:nvPr>
-        </p:nvSpPr>
-        <p:spPr>
-          <a:xfrm>
-            <a:off x="685800" y="4343400"/>
-            <a:ext cx="5486400" cy="4114800"/>
-          </a:xfrm>
-          <a:prstGeom prst="rect">
-            <a:avLst/>
-          </a:prstGeom>
-        </p:spPr>
-        <p:txBody>
-          <a:bodyPr anchorCtr="0" anchor="t" bIns="91425" lIns="91425" spcFirstLastPara="1" rIns="91425" wrap="square" tIns="91425">
-            <a:noAutofit/>
-          </a:bodyPr>
-          <a:lstStyle/>
-          <a:p>
-            <a:pPr indent="0" lvl="0" marL="0" rtl="0" algn="l">
-              <a:spcBef>
-                <a:spcPts val="0"/>
-              </a:spcBef>
-              <a:spcAft>
-                <a:spcPts val="0"/>
-              </a:spcAft>
-              <a:buNone/>
-            </a:pPr>
-            <a:r>
-              <a:t/>
-            </a:r>
-            <a:endParaRPr/>
-          </a:p>
-        </p:txBody>
-      </p:sp>
-      <p:sp>
-        <p:nvSpPr>
-          <p:cNvPr id="158" name="Google Shape;158;p7:notes"/>
-          <p:cNvSpPr/>
-          <p:nvPr>
-            <p:ph idx="2" type="sldImg"/>
-          </p:nvPr>
-        </p:nvSpPr>
-        <p:spPr>
-          <a:xfrm>
-            <a:off x="1143225" y="685800"/>
-            <a:ext cx="4572225" cy="3429000"/>
-          </a:xfrm>
-          <a:custGeom>
-            <a:rect b="b" l="l" r="r" t="t"/>
-            <a:pathLst>
-              <a:path extrusionOk="0" h="120000" w="120000">
-                <a:moveTo>
-                  <a:pt x="0" y="0"/>
-                </a:moveTo>
-                <a:lnTo>
-                  <a:pt x="120000" y="0"/>
-                </a:lnTo>
-                <a:lnTo>
-                  <a:pt x="120000" y="120000"/>
-                </a:lnTo>
-                <a:lnTo>
-                  <a:pt x="0" y="120000"/>
-                </a:lnTo>
-                <a:close/>
-              </a:path>
-            </a:pathLst>
-          </a:custGeom>
-        </p:spPr>
       </p:sp>
     </p:spTree>
   </p:cSld>
@@ -12114,7 +12403,7 @@
       </p:grpSpPr>
       <p:pic>
         <p:nvPicPr>
-          <p:cNvPr id="84" name="Google Shape;84;p1" title="GeNETworkLogoNoBackground.png"/>
+          <p:cNvPr id="84" name="Google Shape;84;p1" title="Black White Minimalist Initials Monogram Jewelry Logo.png"/>
           <p:cNvPicPr preferRelativeResize="0"/>
           <p:nvPr/>
         </p:nvPicPr>
@@ -12128,8 +12417,8 @@
         </p:blipFill>
         <p:spPr>
           <a:xfrm>
-            <a:off x="-81637" y="-1095049"/>
-            <a:ext cx="12355275" cy="8733200"/>
+            <a:off x="-84675" y="-3196150"/>
+            <a:ext cx="12573000" cy="12488325"/>
           </a:xfrm>
           <a:prstGeom prst="rect">
             <a:avLst/>
@@ -12250,7 +12539,7 @@
   <p:cSld>
     <p:spTree>
       <p:nvGrpSpPr>
-        <p:cNvPr id="165" name="Shape 165"/>
+        <p:cNvPr id="171" name="Shape 171"/>
         <p:cNvGrpSpPr/>
         <p:nvPr/>
       </p:nvGrpSpPr>
@@ -12264,7 +12553,241 @@
       </p:grpSpPr>
       <p:sp>
         <p:nvSpPr>
-          <p:cNvPr id="166" name="Google Shape;166;p8"/>
+          <p:cNvPr id="172" name="Google Shape;172;p7"/>
+          <p:cNvSpPr txBox="1"/>
+          <p:nvPr>
+            <p:ph type="title"/>
+          </p:nvPr>
+        </p:nvSpPr>
+        <p:spPr>
+          <a:xfrm>
+            <a:off x="838200" y="365125"/>
+            <a:ext cx="10515600" cy="1325563"/>
+          </a:xfrm>
+          <a:prstGeom prst="rect">
+            <a:avLst/>
+          </a:prstGeom>
+          <a:noFill/>
+          <a:ln>
+            <a:noFill/>
+          </a:ln>
+        </p:spPr>
+        <p:txBody>
+          <a:bodyPr anchorCtr="0" anchor="ctr" bIns="45700" lIns="91425" spcFirstLastPara="1" rIns="91425" wrap="square" tIns="45700">
+            <a:normAutofit/>
+          </a:bodyPr>
+          <a:lstStyle/>
+          <a:p>
+            <a:pPr indent="0" lvl="0" marL="0" rtl="0" algn="l">
+              <a:lnSpc>
+                <a:spcPct val="90000"/>
+              </a:lnSpc>
+              <a:spcBef>
+                <a:spcPts val="0"/>
+              </a:spcBef>
+              <a:spcAft>
+                <a:spcPts val="0"/>
+              </a:spcAft>
+              <a:buClr>
+                <a:schemeClr val="dk1"/>
+              </a:buClr>
+              <a:buSzPts val="4400"/>
+              <a:buFont typeface="Play"/>
+              <a:buNone/>
+            </a:pPr>
+            <a:r>
+              <a:rPr lang="en-US"/>
+              <a:t>Future Directions</a:t>
+            </a:r>
+            <a:endParaRPr/>
+          </a:p>
+        </p:txBody>
+      </p:sp>
+      <p:sp>
+        <p:nvSpPr>
+          <p:cNvPr id="173" name="Google Shape;173;p7"/>
+          <p:cNvSpPr txBox="1"/>
+          <p:nvPr>
+            <p:ph idx="1" type="body"/>
+          </p:nvPr>
+        </p:nvSpPr>
+        <p:spPr>
+          <a:xfrm>
+            <a:off x="838200" y="1825625"/>
+            <a:ext cx="10515600" cy="4351200"/>
+          </a:xfrm>
+          <a:prstGeom prst="rect">
+            <a:avLst/>
+          </a:prstGeom>
+          <a:noFill/>
+          <a:ln>
+            <a:noFill/>
+          </a:ln>
+        </p:spPr>
+        <p:txBody>
+          <a:bodyPr anchorCtr="0" anchor="t" bIns="45700" lIns="91425" spcFirstLastPara="1" rIns="91425" wrap="square" tIns="45700">
+            <a:normAutofit/>
+          </a:bodyPr>
+          <a:lstStyle/>
+          <a:p>
+            <a:pPr indent="-361950" lvl="0" marL="457200" rtl="0" algn="l">
+              <a:lnSpc>
+                <a:spcPct val="115000"/>
+              </a:lnSpc>
+              <a:spcBef>
+                <a:spcPts val="0"/>
+              </a:spcBef>
+              <a:spcAft>
+                <a:spcPts val="0"/>
+              </a:spcAft>
+              <a:buSzPts val="2100"/>
+              <a:buChar char="•"/>
+            </a:pPr>
+            <a:r>
+              <a:rPr lang="en-US" sz="2100" u="sng">
+                <a:solidFill>
+                  <a:srgbClr val="1155CC"/>
+                </a:solidFill>
+                <a:hlinkClick r:id="rId4">
+                  <a:extLst>
+                    <a:ext uri="{A12FA001-AC4F-418D-AE19-62706E023703}">
+                      <ahyp:hlinkClr val="tx"/>
+                    </a:ext>
+                  </a:extLst>
+                </a:hlinkClick>
+              </a:rPr>
+              <a:t>ClinicalTrials.gov</a:t>
+            </a:r>
+            <a:r>
+              <a:rPr lang="en-US" sz="2100"/>
+              <a:t> integration</a:t>
+            </a:r>
+            <a:endParaRPr sz="2100"/>
+          </a:p>
+          <a:p>
+            <a:pPr indent="-361950" lvl="0" marL="457200" rtl="0" algn="l">
+              <a:lnSpc>
+                <a:spcPct val="115000"/>
+              </a:lnSpc>
+              <a:spcBef>
+                <a:spcPts val="0"/>
+              </a:spcBef>
+              <a:spcAft>
+                <a:spcPts val="0"/>
+              </a:spcAft>
+              <a:buSzPts val="2100"/>
+              <a:buChar char="•"/>
+            </a:pPr>
+            <a:r>
+              <a:rPr lang="en-US" sz="2100"/>
+              <a:t>Add new data layers such as CNAs, gene fusions, drug sensitivity screens</a:t>
+            </a:r>
+            <a:endParaRPr sz="2100"/>
+          </a:p>
+          <a:p>
+            <a:pPr indent="-361950" lvl="0" marL="457200" rtl="0" algn="l">
+              <a:lnSpc>
+                <a:spcPct val="115000"/>
+              </a:lnSpc>
+              <a:spcBef>
+                <a:spcPts val="0"/>
+              </a:spcBef>
+              <a:spcAft>
+                <a:spcPts val="0"/>
+              </a:spcAft>
+              <a:buSzPts val="2100"/>
+              <a:buChar char="•"/>
+            </a:pPr>
+            <a:r>
+              <a:rPr lang="en-US" sz="2100"/>
+              <a:t>Graph neural networks could predict novel drug-gene associations</a:t>
+            </a:r>
+            <a:endParaRPr sz="2100"/>
+          </a:p>
+          <a:p>
+            <a:pPr indent="-361950" lvl="0" marL="457200" rtl="0" algn="l">
+              <a:lnSpc>
+                <a:spcPct val="115000"/>
+              </a:lnSpc>
+              <a:spcBef>
+                <a:spcPts val="0"/>
+              </a:spcBef>
+              <a:spcAft>
+                <a:spcPts val="0"/>
+              </a:spcAft>
+              <a:buSzPts val="2100"/>
+              <a:buChar char="•"/>
+            </a:pPr>
+            <a:r>
+              <a:rPr lang="en-US" sz="2100"/>
+              <a:t>Expand beyond cancer to include off-label therapeutic indications</a:t>
+            </a:r>
+            <a:endParaRPr sz="2100"/>
+          </a:p>
+          <a:p>
+            <a:pPr indent="-361950" lvl="0" marL="457200" rtl="0" algn="l">
+              <a:lnSpc>
+                <a:spcPct val="115000"/>
+              </a:lnSpc>
+              <a:spcBef>
+                <a:spcPts val="0"/>
+              </a:spcBef>
+              <a:spcAft>
+                <a:spcPts val="0"/>
+              </a:spcAft>
+              <a:buSzPts val="2100"/>
+              <a:buChar char="•"/>
+            </a:pPr>
+            <a:r>
+              <a:rPr lang="en-US" sz="2100"/>
+              <a:t>Integrate </a:t>
+            </a:r>
+            <a:r>
+              <a:rPr lang="en-US" sz="2100">
+                <a:extLst>
+                  <a:ext uri="http://customooxmlschemas.google.com/">
+                    <go:slidesCustomData xmlns:go="http://customooxmlschemas.google.com/" textRoundtripDataId="0"/>
+                  </a:ext>
+                </a:extLst>
+              </a:rPr>
+              <a:t>gene-based GWAS</a:t>
+            </a:r>
+            <a:r>
+              <a:rPr lang="en-US" sz="2100"/>
+              <a:t> to find new targets</a:t>
+            </a:r>
+            <a:endParaRPr sz="2100"/>
+          </a:p>
+        </p:txBody>
+      </p:sp>
+    </p:spTree>
+  </p:cSld>
+  <p:clrMapOvr>
+    <a:masterClrMapping/>
+  </p:clrMapOvr>
+</p:sld>
+</file>
+
+<file path=ppt/slides/slide11.xml><?xml version="1.0" encoding="utf-8"?>
+<p:sld xmlns:a="http://schemas.openxmlformats.org/drawingml/2006/main" xmlns:r="http://schemas.openxmlformats.org/officeDocument/2006/relationships" xmlns:mc="http://schemas.openxmlformats.org/markup-compatibility/2006" xmlns:mv="urn:schemas-microsoft-com:mac:vml" xmlns:p="http://schemas.openxmlformats.org/presentationml/2006/main" xmlns:c="http://schemas.openxmlformats.org/drawingml/2006/chart" xmlns:dgm="http://schemas.openxmlformats.org/drawingml/2006/diagram" xmlns:o="urn:schemas-microsoft-com:office:office" xmlns:v="urn:schemas-microsoft-com:vml" xmlns:pvml="urn:schemas-microsoft-com:office:powerpoint" xmlns:com="http://schemas.openxmlformats.org/drawingml/2006/compatibility" xmlns:p14="http://schemas.microsoft.com/office/powerpoint/2010/main" xmlns:p15="http://schemas.microsoft.com/office/powerpoint/2012/main" xmlns:ahyp="http://schemas.microsoft.com/office/drawing/2018/hyperlinkcolor">
+  <p:cSld>
+    <p:spTree>
+      <p:nvGrpSpPr>
+        <p:cNvPr id="177" name="Shape 177"/>
+        <p:cNvGrpSpPr/>
+        <p:nvPr/>
+      </p:nvGrpSpPr>
+      <p:grpSpPr>
+        <a:xfrm>
+          <a:off x="0" y="0"/>
+          <a:ext cx="0" cy="0"/>
+          <a:chOff x="0" y="0"/>
+          <a:chExt cx="0" cy="0"/>
+        </a:xfrm>
+      </p:grpSpPr>
+      <p:sp>
+        <p:nvSpPr>
+          <p:cNvPr id="178" name="Google Shape;178;p8"/>
           <p:cNvSpPr txBox="1"/>
           <p:nvPr>
             <p:ph idx="1" type="body"/>
@@ -12395,7 +12918,7 @@
       </p:sp>
       <p:sp>
         <p:nvSpPr>
-          <p:cNvPr id="167" name="Google Shape;167;p8"/>
+          <p:cNvPr id="179" name="Google Shape;179;p8"/>
           <p:cNvSpPr txBox="1"/>
           <p:nvPr>
             <p:ph type="title"/>
@@ -12447,7 +12970,7 @@
       </p:sp>
       <p:sp>
         <p:nvSpPr>
-          <p:cNvPr id="168" name="Google Shape;168;p8"/>
+          <p:cNvPr id="180" name="Google Shape;180;p8"/>
           <p:cNvSpPr txBox="1"/>
           <p:nvPr>
             <p:ph idx="1" type="body"/>
@@ -13644,7 +14167,7 @@
                   <a:schemeClr val="dk2"/>
                 </a:solidFill>
               </a:rPr>
-              <a:t>Edges:gene_has_variant_src, ASSOCIATED_WITH_PATHWAY, TARGETED_BY_DRUG (more tbd)</a:t>
+              <a:t>Edges:gene_has_variant_src, ASSOCIATED_WITH_PATHWAY, TARGETED_BY_DRUG</a:t>
             </a:r>
             <a:endParaRPr/>
           </a:p>
@@ -16277,7 +16800,390 @@
       </p:grpSpPr>
       <p:sp>
         <p:nvSpPr>
-          <p:cNvPr id="146" name="Google Shape;146;g388e2ef6367_0_4"/>
+          <p:cNvPr id="146" name="Google Shape;146;g388e2ef6367_9_13"/>
+          <p:cNvSpPr txBox="1"/>
+          <p:nvPr>
+            <p:ph type="title"/>
+          </p:nvPr>
+        </p:nvSpPr>
+        <p:spPr>
+          <a:xfrm>
+            <a:off x="838200" y="365125"/>
+            <a:ext cx="10515600" cy="1325700"/>
+          </a:xfrm>
+          <a:prstGeom prst="rect">
+            <a:avLst/>
+          </a:prstGeom>
+        </p:spPr>
+        <p:txBody>
+          <a:bodyPr anchorCtr="0" anchor="ctr" bIns="45700" lIns="91425" spcFirstLastPara="1" rIns="91425" wrap="square" tIns="45700">
+            <a:normAutofit/>
+          </a:bodyPr>
+          <a:lstStyle/>
+          <a:p>
+            <a:pPr indent="0" lvl="0" marL="0" rtl="0" algn="l">
+              <a:spcBef>
+                <a:spcPts val="0"/>
+              </a:spcBef>
+              <a:spcAft>
+                <a:spcPts val="0"/>
+              </a:spcAft>
+              <a:buNone/>
+            </a:pPr>
+            <a:r>
+              <a:rPr lang="en-US"/>
+              <a:t>Pathway-centric query</a:t>
+            </a:r>
+            <a:endParaRPr/>
+          </a:p>
+        </p:txBody>
+      </p:sp>
+      <p:sp>
+        <p:nvSpPr>
+          <p:cNvPr id="147" name="Google Shape;147;g388e2ef6367_9_13"/>
+          <p:cNvSpPr txBox="1"/>
+          <p:nvPr>
+            <p:ph idx="1" type="body"/>
+          </p:nvPr>
+        </p:nvSpPr>
+        <p:spPr>
+          <a:xfrm>
+            <a:off x="838200" y="1473775"/>
+            <a:ext cx="10515600" cy="4351200"/>
+          </a:xfrm>
+          <a:prstGeom prst="rect">
+            <a:avLst/>
+          </a:prstGeom>
+        </p:spPr>
+        <p:txBody>
+          <a:bodyPr anchorCtr="0" anchor="t" bIns="45700" lIns="91425" spcFirstLastPara="1" rIns="91425" wrap="square" tIns="45700">
+            <a:normAutofit/>
+          </a:bodyPr>
+          <a:lstStyle/>
+          <a:p>
+            <a:pPr indent="0" lvl="0" marL="0" rtl="0" algn="l">
+              <a:spcBef>
+                <a:spcPts val="0"/>
+              </a:spcBef>
+              <a:spcAft>
+                <a:spcPts val="0"/>
+              </a:spcAft>
+              <a:buNone/>
+            </a:pPr>
+            <a:r>
+              <a:rPr b="1" lang="en-US"/>
+              <a:t>Oncogene Induced Senescence </a:t>
+            </a:r>
+            <a:endParaRPr b="1"/>
+          </a:p>
+          <a:p>
+            <a:pPr indent="0" lvl="0" marL="0" rtl="0" algn="l">
+              <a:spcBef>
+                <a:spcPts val="0"/>
+              </a:spcBef>
+              <a:spcAft>
+                <a:spcPts val="0"/>
+              </a:spcAft>
+              <a:buClr>
+                <a:schemeClr val="dk1"/>
+              </a:buClr>
+              <a:buSzPts val="1100"/>
+              <a:buFont typeface="Arial"/>
+              <a:buNone/>
+            </a:pPr>
+            <a:r>
+              <a:rPr lang="en-US"/>
+              <a:t>in </a:t>
+            </a:r>
+            <a:r>
+              <a:rPr b="1" lang="en-US">
+                <a:solidFill>
+                  <a:srgbClr val="CC0000"/>
+                </a:solidFill>
+              </a:rPr>
+              <a:t>Melanoma</a:t>
+            </a:r>
+            <a:endParaRPr b="1">
+              <a:solidFill>
+                <a:srgbClr val="CC0000"/>
+              </a:solidFill>
+            </a:endParaRPr>
+          </a:p>
+          <a:p>
+            <a:pPr indent="0" lvl="0" marL="0" rtl="0" algn="l">
+              <a:spcBef>
+                <a:spcPts val="1000"/>
+              </a:spcBef>
+              <a:spcAft>
+                <a:spcPts val="0"/>
+              </a:spcAft>
+              <a:buNone/>
+            </a:pPr>
+            <a:r>
+              <a:t/>
+            </a:r>
+            <a:endParaRPr sz="2900"/>
+          </a:p>
+        </p:txBody>
+      </p:sp>
+      <p:pic>
+        <p:nvPicPr>
+          <p:cNvPr id="148" name="Google Shape;148;g388e2ef6367_9_13" title="graph.png"/>
+          <p:cNvPicPr preferRelativeResize="0"/>
+          <p:nvPr/>
+        </p:nvPicPr>
+        <p:blipFill>
+          <a:blip r:embed="rId3">
+            <a:alphaModFix/>
+          </a:blip>
+          <a:stretch>
+            <a:fillRect/>
+          </a:stretch>
+        </p:blipFill>
+        <p:spPr>
+          <a:xfrm>
+            <a:off x="5074926" y="83200"/>
+            <a:ext cx="7022774" cy="6556850"/>
+          </a:xfrm>
+          <a:prstGeom prst="rect">
+            <a:avLst/>
+          </a:prstGeom>
+          <a:noFill/>
+          <a:ln>
+            <a:noFill/>
+          </a:ln>
+        </p:spPr>
+      </p:pic>
+      <p:sp>
+        <p:nvSpPr>
+          <p:cNvPr id="149" name="Google Shape;149;g388e2ef6367_9_13"/>
+          <p:cNvSpPr txBox="1"/>
+          <p:nvPr/>
+        </p:nvSpPr>
+        <p:spPr>
+          <a:xfrm>
+            <a:off x="838200" y="2456425"/>
+            <a:ext cx="6215400" cy="1293000"/>
+          </a:xfrm>
+          <a:prstGeom prst="rect">
+            <a:avLst/>
+          </a:prstGeom>
+          <a:noFill/>
+          <a:ln>
+            <a:noFill/>
+          </a:ln>
+        </p:spPr>
+        <p:txBody>
+          <a:bodyPr anchorCtr="0" anchor="t" bIns="91425" lIns="91425" spcFirstLastPara="1" rIns="91425" wrap="square" tIns="91425">
+            <a:spAutoFit/>
+          </a:bodyPr>
+          <a:lstStyle/>
+          <a:p>
+            <a:pPr indent="0" lvl="0" marL="0" rtl="0" algn="l">
+              <a:spcBef>
+                <a:spcPts val="0"/>
+              </a:spcBef>
+              <a:spcAft>
+                <a:spcPts val="0"/>
+              </a:spcAft>
+              <a:buNone/>
+            </a:pPr>
+            <a:r>
+              <a:rPr i="1" lang="en-US" sz="2400">
+                <a:solidFill>
+                  <a:schemeClr val="dk1"/>
+                </a:solidFill>
+              </a:rPr>
+              <a:t>- </a:t>
+            </a:r>
+            <a:r>
+              <a:rPr i="1" lang="en-US" sz="2400">
+                <a:solidFill>
+                  <a:schemeClr val="dk1"/>
+                </a:solidFill>
+              </a:rPr>
+              <a:t>is a tumor-suppressive mechanism; its dysregulation contributes to melanoma progression.</a:t>
+            </a:r>
+            <a:endParaRPr i="1" sz="2400">
+              <a:solidFill>
+                <a:schemeClr val="dk1"/>
+              </a:solidFill>
+            </a:endParaRPr>
+          </a:p>
+        </p:txBody>
+      </p:sp>
+      <p:sp>
+        <p:nvSpPr>
+          <p:cNvPr id="150" name="Google Shape;150;g388e2ef6367_9_13"/>
+          <p:cNvSpPr txBox="1"/>
+          <p:nvPr/>
+        </p:nvSpPr>
+        <p:spPr>
+          <a:xfrm>
+            <a:off x="838200" y="3880400"/>
+            <a:ext cx="4121400" cy="2401200"/>
+          </a:xfrm>
+          <a:prstGeom prst="rect">
+            <a:avLst/>
+          </a:prstGeom>
+          <a:noFill/>
+          <a:ln>
+            <a:noFill/>
+          </a:ln>
+        </p:spPr>
+        <p:txBody>
+          <a:bodyPr anchorCtr="0" anchor="t" bIns="91425" lIns="91425" spcFirstLastPara="1" rIns="91425" wrap="square" tIns="91425">
+            <a:spAutoFit/>
+          </a:bodyPr>
+          <a:lstStyle/>
+          <a:p>
+            <a:pPr indent="0" lvl="0" marL="0" rtl="0" algn="l">
+              <a:spcBef>
+                <a:spcPts val="0"/>
+              </a:spcBef>
+              <a:spcAft>
+                <a:spcPts val="0"/>
+              </a:spcAft>
+              <a:buNone/>
+            </a:pPr>
+            <a:r>
+              <a:rPr lang="en-US" sz="2400">
+                <a:solidFill>
+                  <a:schemeClr val="dk1"/>
+                </a:solidFill>
+              </a:rPr>
+              <a:t>Genes </a:t>
+            </a:r>
+            <a:r>
+              <a:rPr b="1" lang="en-US" sz="2400">
+                <a:solidFill>
+                  <a:schemeClr val="dk1"/>
+                </a:solidFill>
+              </a:rPr>
+              <a:t>highlight targets </a:t>
+            </a:r>
+            <a:r>
+              <a:rPr lang="en-US" sz="2400">
+                <a:solidFill>
+                  <a:schemeClr val="dk1"/>
+                </a:solidFill>
+              </a:rPr>
+              <a:t>to restore or bypass senescence; linking them to </a:t>
+            </a:r>
+            <a:r>
+              <a:rPr b="1" lang="en-US" sz="2400">
+                <a:solidFill>
+                  <a:schemeClr val="dk1"/>
+                </a:solidFill>
+              </a:rPr>
+              <a:t>drugs</a:t>
+            </a:r>
+            <a:r>
+              <a:rPr lang="en-US" sz="2400">
+                <a:solidFill>
+                  <a:schemeClr val="dk1"/>
+                </a:solidFill>
+              </a:rPr>
+              <a:t> reveals </a:t>
+            </a:r>
+            <a:r>
+              <a:rPr b="1" lang="en-US" sz="2400">
+                <a:solidFill>
+                  <a:schemeClr val="dk1"/>
+                </a:solidFill>
+              </a:rPr>
+              <a:t>repurposing</a:t>
+            </a:r>
+            <a:r>
+              <a:rPr lang="en-US" sz="2400">
+                <a:solidFill>
+                  <a:schemeClr val="dk1"/>
+                </a:solidFill>
+              </a:rPr>
+              <a:t>, combinations, and new interventions.</a:t>
+            </a:r>
+            <a:endParaRPr/>
+          </a:p>
+        </p:txBody>
+      </p:sp>
+      <p:sp>
+        <p:nvSpPr>
+          <p:cNvPr id="151" name="Google Shape;151;g388e2ef6367_9_13"/>
+          <p:cNvSpPr txBox="1"/>
+          <p:nvPr/>
+        </p:nvSpPr>
+        <p:spPr>
+          <a:xfrm>
+            <a:off x="0" y="0"/>
+            <a:ext cx="6215400" cy="554100"/>
+          </a:xfrm>
+          <a:prstGeom prst="rect">
+            <a:avLst/>
+          </a:prstGeom>
+          <a:noFill/>
+          <a:ln>
+            <a:noFill/>
+          </a:ln>
+        </p:spPr>
+        <p:txBody>
+          <a:bodyPr anchorCtr="0" anchor="t" bIns="91425" lIns="91425" spcFirstLastPara="1" rIns="91425" wrap="square" tIns="91425">
+            <a:spAutoFit/>
+          </a:bodyPr>
+          <a:lstStyle/>
+          <a:p>
+            <a:pPr indent="0" lvl="0" marL="0" rtl="0" algn="l">
+              <a:spcBef>
+                <a:spcPts val="0"/>
+              </a:spcBef>
+              <a:spcAft>
+                <a:spcPts val="0"/>
+              </a:spcAft>
+              <a:buNone/>
+            </a:pPr>
+            <a:r>
+              <a:rPr lang="en-US" sz="2400">
+                <a:solidFill>
+                  <a:srgbClr val="757575"/>
+                </a:solidFill>
+              </a:rPr>
+              <a:t>Use case example</a:t>
+            </a:r>
+            <a:endParaRPr sz="2400">
+              <a:solidFill>
+                <a:srgbClr val="757575"/>
+              </a:solidFill>
+            </a:endParaRPr>
+          </a:p>
+        </p:txBody>
+      </p:sp>
+    </p:spTree>
+  </p:cSld>
+  <p:clrMapOvr>
+    <a:masterClrMapping/>
+  </p:clrMapOvr>
+</p:sld>
+</file>
+
+<file path=ppt/slides/slide8.xml><?xml version="1.0" encoding="utf-8"?>
+<p:sld xmlns:a="http://schemas.openxmlformats.org/drawingml/2006/main" xmlns:r="http://schemas.openxmlformats.org/officeDocument/2006/relationships" xmlns:mc="http://schemas.openxmlformats.org/markup-compatibility/2006" xmlns:mv="urn:schemas-microsoft-com:mac:vml" xmlns:p="http://schemas.openxmlformats.org/presentationml/2006/main" xmlns:c="http://schemas.openxmlformats.org/drawingml/2006/chart" xmlns:dgm="http://schemas.openxmlformats.org/drawingml/2006/diagram" xmlns:o="urn:schemas-microsoft-com:office:office" xmlns:v="urn:schemas-microsoft-com:vml" xmlns:pvml="urn:schemas-microsoft-com:office:powerpoint" xmlns:com="http://schemas.openxmlformats.org/drawingml/2006/compatibility" xmlns:p14="http://schemas.microsoft.com/office/powerpoint/2010/main" xmlns:p15="http://schemas.microsoft.com/office/powerpoint/2012/main" xmlns:ahyp="http://schemas.microsoft.com/office/drawing/2018/hyperlinkcolor">
+  <p:cSld>
+    <p:spTree>
+      <p:nvGrpSpPr>
+        <p:cNvPr id="155" name="Shape 155"/>
+        <p:cNvGrpSpPr/>
+        <p:nvPr/>
+      </p:nvGrpSpPr>
+      <p:grpSpPr>
+        <a:xfrm>
+          <a:off x="0" y="0"/>
+          <a:ext cx="0" cy="0"/>
+          <a:chOff x="0" y="0"/>
+          <a:chExt cx="0" cy="0"/>
+        </a:xfrm>
+      </p:grpSpPr>
+      <p:sp>
+        <p:nvSpPr>
+          <p:cNvPr id="156" name="Google Shape;156;g388e2ef6367_0_11"/>
           <p:cNvSpPr txBox="1"/>
           <p:nvPr>
             <p:ph type="title"/>
@@ -16309,47 +17215,7 @@
             </a:pPr>
             <a:r>
               <a:rPr lang="en-US"/>
-              <a:t>GeNETwork KG</a:t>
-            </a:r>
-            <a:endParaRPr/>
-          </a:p>
-        </p:txBody>
-      </p:sp>
-      <p:sp>
-        <p:nvSpPr>
-          <p:cNvPr id="147" name="Google Shape;147;g388e2ef6367_0_4"/>
-          <p:cNvSpPr txBox="1"/>
-          <p:nvPr>
-            <p:ph idx="1" type="body"/>
-          </p:nvPr>
-        </p:nvSpPr>
-        <p:spPr>
-          <a:xfrm>
-            <a:off x="838200" y="1472850"/>
-            <a:ext cx="10044900" cy="520200"/>
-          </a:xfrm>
-          <a:prstGeom prst="rect">
-            <a:avLst/>
-          </a:prstGeom>
-        </p:spPr>
-        <p:txBody>
-          <a:bodyPr anchorCtr="0" anchor="t" bIns="45700" lIns="91425" spcFirstLastPara="1" rIns="91425" wrap="square" tIns="45700">
-            <a:normAutofit fontScale="85000"/>
-          </a:bodyPr>
-          <a:lstStyle/>
-          <a:p>
-            <a:pPr indent="0" lvl="0" marL="0" rtl="0" algn="l">
-              <a:spcBef>
-                <a:spcPts val="1000"/>
-              </a:spcBef>
-              <a:spcAft>
-                <a:spcPts val="0"/>
-              </a:spcAft>
-              <a:buNone/>
-            </a:pPr>
-            <a:r>
-              <a:rPr lang="en-US"/>
-              <a:t>[Image Placeholder, Replace below with something more comprehensive]</a:t>
+              <a:t>Creating Induced Subgraphs</a:t>
             </a:r>
             <a:endParaRPr/>
           </a:p>
@@ -16357,7 +17223,7 @@
       </p:sp>
       <p:pic>
         <p:nvPicPr>
-          <p:cNvPr id="148" name="Google Shape;148;g388e2ef6367_0_4"/>
+          <p:cNvPr id="157" name="Google Shape;157;g388e2ef6367_0_11"/>
           <p:cNvPicPr preferRelativeResize="0"/>
           <p:nvPr/>
         </p:nvPicPr>
@@ -16371,8 +17237,8 @@
         </p:blipFill>
         <p:spPr>
           <a:xfrm>
-            <a:off x="1575617" y="2092597"/>
-            <a:ext cx="9040763" cy="4542454"/>
+            <a:off x="152400" y="1843225"/>
+            <a:ext cx="5833723" cy="4224552"/>
           </a:xfrm>
           <a:prstGeom prst="rect">
             <a:avLst/>
@@ -16383,6 +17249,198 @@
           </a:ln>
         </p:spPr>
       </p:pic>
+      <p:sp>
+        <p:nvSpPr>
+          <p:cNvPr id="158" name="Google Shape;158;g388e2ef6367_0_11"/>
+          <p:cNvSpPr txBox="1"/>
+          <p:nvPr/>
+        </p:nvSpPr>
+        <p:spPr>
+          <a:xfrm>
+            <a:off x="6544025" y="1993200"/>
+            <a:ext cx="5203500" cy="3915900"/>
+          </a:xfrm>
+          <a:prstGeom prst="rect">
+            <a:avLst/>
+          </a:prstGeom>
+          <a:noFill/>
+          <a:ln>
+            <a:noFill/>
+          </a:ln>
+        </p:spPr>
+        <p:txBody>
+          <a:bodyPr anchorCtr="0" anchor="t" bIns="91425" lIns="91425" spcFirstLastPara="1" rIns="91425" wrap="square" tIns="91425">
+            <a:noAutofit/>
+          </a:bodyPr>
+          <a:lstStyle/>
+          <a:p>
+            <a:pPr indent="-406400" lvl="0" marL="457200" rtl="0" algn="l">
+              <a:spcBef>
+                <a:spcPts val="0"/>
+              </a:spcBef>
+              <a:spcAft>
+                <a:spcPts val="0"/>
+              </a:spcAft>
+              <a:buClr>
+                <a:schemeClr val="dk1"/>
+              </a:buClr>
+              <a:buSzPts val="2800"/>
+              <a:buChar char="●"/>
+            </a:pPr>
+            <a:r>
+              <a:rPr lang="en-US" sz="2800">
+                <a:solidFill>
+                  <a:schemeClr val="dk1"/>
+                </a:solidFill>
+              </a:rPr>
+              <a:t>Induced subgraphs can be created given any set of nodes.</a:t>
+            </a:r>
+            <a:endParaRPr sz="2800">
+              <a:solidFill>
+                <a:schemeClr val="dk1"/>
+              </a:solidFill>
+            </a:endParaRPr>
+          </a:p>
+          <a:p>
+            <a:pPr indent="-406400" lvl="0" marL="457200" rtl="0" algn="l">
+              <a:spcBef>
+                <a:spcPts val="0"/>
+              </a:spcBef>
+              <a:spcAft>
+                <a:spcPts val="0"/>
+              </a:spcAft>
+              <a:buClr>
+                <a:schemeClr val="dk1"/>
+              </a:buClr>
+              <a:buSzPts val="2800"/>
+              <a:buChar char="●"/>
+            </a:pPr>
+            <a:r>
+              <a:rPr lang="en-US" sz="2800">
+                <a:solidFill>
+                  <a:schemeClr val="dk1"/>
+                </a:solidFill>
+              </a:rPr>
+              <a:t>Subgraph includes neighboring nodes and their inner connections.</a:t>
+            </a:r>
+            <a:endParaRPr sz="2800">
+              <a:solidFill>
+                <a:schemeClr val="dk1"/>
+              </a:solidFill>
+            </a:endParaRPr>
+          </a:p>
+          <a:p>
+            <a:pPr indent="-406400" lvl="0" marL="457200" rtl="0" algn="l">
+              <a:spcBef>
+                <a:spcPts val="0"/>
+              </a:spcBef>
+              <a:spcAft>
+                <a:spcPts val="0"/>
+              </a:spcAft>
+              <a:buClr>
+                <a:schemeClr val="dk1"/>
+              </a:buClr>
+              <a:buSzPts val="2800"/>
+              <a:buChar char="●"/>
+            </a:pPr>
+            <a:r>
+              <a:rPr lang="en-US" sz="2800">
+                <a:solidFill>
+                  <a:schemeClr val="dk1"/>
+                </a:solidFill>
+              </a:rPr>
+              <a:t>Can be used for </a:t>
+            </a:r>
+            <a:r>
+              <a:rPr lang="en-US" sz="2800">
+                <a:solidFill>
+                  <a:schemeClr val="dk1"/>
+                </a:solidFill>
+              </a:rPr>
+              <a:t>downstream</a:t>
+            </a:r>
+            <a:r>
+              <a:rPr lang="en-US" sz="2800">
+                <a:solidFill>
+                  <a:schemeClr val="dk1"/>
+                </a:solidFill>
+              </a:rPr>
+              <a:t> ML model training and </a:t>
+            </a:r>
+            <a:r>
+              <a:rPr lang="en-US" sz="2800">
+                <a:solidFill>
+                  <a:schemeClr val="dk1"/>
+                </a:solidFill>
+              </a:rPr>
+              <a:t>inference</a:t>
+            </a:r>
+            <a:r>
+              <a:rPr lang="en-US" sz="2800">
+                <a:solidFill>
+                  <a:schemeClr val="dk1"/>
+                </a:solidFill>
+              </a:rPr>
+              <a:t>.</a:t>
+            </a:r>
+            <a:endParaRPr sz="2800">
+              <a:solidFill>
+                <a:schemeClr val="dk1"/>
+              </a:solidFill>
+            </a:endParaRPr>
+          </a:p>
+        </p:txBody>
+      </p:sp>
+      <p:sp>
+        <p:nvSpPr>
+          <p:cNvPr id="159" name="Google Shape;159;g388e2ef6367_0_11"/>
+          <p:cNvSpPr txBox="1"/>
+          <p:nvPr/>
+        </p:nvSpPr>
+        <p:spPr>
+          <a:xfrm>
+            <a:off x="152400" y="5909100"/>
+            <a:ext cx="6091800" cy="811500"/>
+          </a:xfrm>
+          <a:prstGeom prst="rect">
+            <a:avLst/>
+          </a:prstGeom>
+          <a:noFill/>
+          <a:ln>
+            <a:noFill/>
+          </a:ln>
+        </p:spPr>
+        <p:txBody>
+          <a:bodyPr anchorCtr="0" anchor="t" bIns="91425" lIns="91425" spcFirstLastPara="1" rIns="91425" wrap="square" tIns="91425">
+            <a:noAutofit/>
+          </a:bodyPr>
+          <a:lstStyle/>
+          <a:p>
+            <a:pPr indent="0" lvl="0" marL="0" rtl="0" algn="ctr">
+              <a:spcBef>
+                <a:spcPts val="0"/>
+              </a:spcBef>
+              <a:spcAft>
+                <a:spcPts val="0"/>
+              </a:spcAft>
+              <a:buNone/>
+            </a:pPr>
+            <a:r>
+              <a:rPr lang="en-US" sz="1800">
+                <a:solidFill>
+                  <a:schemeClr val="dk1"/>
+                </a:solidFill>
+              </a:rPr>
+              <a:t>TP53 Subgraph (genes+variants+pathways+processes+perturbations)</a:t>
+            </a:r>
+            <a:endParaRPr sz="1800">
+              <a:solidFill>
+                <a:schemeClr val="dk1"/>
+              </a:solidFill>
+            </a:endParaRPr>
+          </a:p>
+        </p:txBody>
+      </p:sp>
     </p:spTree>
   </p:cSld>
   <p:clrMapOvr>
@@ -16391,12 +17449,12 @@
 </p:sld>
 </file>
 
-<file path=ppt/slides/slide8.xml><?xml version="1.0" encoding="utf-8"?>
+<file path=ppt/slides/slide9.xml><?xml version="1.0" encoding="utf-8"?>
 <p:sld xmlns:a="http://schemas.openxmlformats.org/drawingml/2006/main" xmlns:r="http://schemas.openxmlformats.org/officeDocument/2006/relationships" xmlns:mc="http://schemas.openxmlformats.org/markup-compatibility/2006" xmlns:mv="urn:schemas-microsoft-com:mac:vml" xmlns:p="http://schemas.openxmlformats.org/presentationml/2006/main" xmlns:c="http://schemas.openxmlformats.org/drawingml/2006/chart" xmlns:dgm="http://schemas.openxmlformats.org/drawingml/2006/diagram" xmlns:o="urn:schemas-microsoft-com:office:office" xmlns:v="urn:schemas-microsoft-com:vml" xmlns:pvml="urn:schemas-microsoft-com:office:powerpoint" xmlns:com="http://schemas.openxmlformats.org/drawingml/2006/compatibility" xmlns:p14="http://schemas.microsoft.com/office/powerpoint/2010/main" xmlns:p15="http://schemas.microsoft.com/office/powerpoint/2012/main" xmlns:ahyp="http://schemas.microsoft.com/office/drawing/2018/hyperlinkcolor">
   <p:cSld>
     <p:spTree>
       <p:nvGrpSpPr>
-        <p:cNvPr id="152" name="Shape 152"/>
+        <p:cNvPr id="163" name="Shape 163"/>
         <p:cNvGrpSpPr/>
         <p:nvPr/>
       </p:nvGrpSpPr>
@@ -16410,7 +17468,7 @@
       </p:grpSpPr>
       <p:sp>
         <p:nvSpPr>
-          <p:cNvPr id="153" name="Google Shape;153;g388e2ef6367_9_3"/>
+          <p:cNvPr id="164" name="Google Shape;164;g388e2ef6367_9_3"/>
           <p:cNvSpPr txBox="1"/>
           <p:nvPr>
             <p:ph type="title"/>
@@ -16418,8 +17476,8 @@
         </p:nvSpPr>
         <p:spPr>
           <a:xfrm>
-            <a:off x="838200" y="365125"/>
-            <a:ext cx="10515600" cy="1325700"/>
+            <a:off x="582075" y="259299"/>
+            <a:ext cx="11001000" cy="1148400"/>
           </a:xfrm>
           <a:prstGeom prst="rect">
             <a:avLst/>
@@ -16442,7 +17500,7 @@
             </a:pPr>
             <a:r>
               <a:rPr lang="en-US"/>
-              <a:t>Statistics on the GeNETwork KG</a:t>
+              <a:t>Statistics on the GeNETwork KG subgraph</a:t>
             </a:r>
             <a:endParaRPr/>
           </a:p>
@@ -16450,7 +17508,7 @@
       </p:sp>
       <p:pic>
         <p:nvPicPr>
-          <p:cNvPr id="154" name="Google Shape;154;g388e2ef6367_9_3"/>
+          <p:cNvPr id="165" name="Google Shape;165;g388e2ef6367_9_3"/>
           <p:cNvPicPr preferRelativeResize="0"/>
           <p:nvPr/>
         </p:nvPicPr>
@@ -16464,7 +17522,7 @@
         </p:blipFill>
         <p:spPr>
           <a:xfrm>
-            <a:off x="838200" y="2060225"/>
+            <a:off x="838200" y="1407586"/>
             <a:ext cx="5917500" cy="4572000"/>
           </a:xfrm>
           <a:prstGeom prst="rect">
@@ -16478,7 +17536,7 @@
       </p:pic>
       <p:sp>
         <p:nvSpPr>
-          <p:cNvPr id="155" name="Google Shape;155;g388e2ef6367_9_3"/>
+          <p:cNvPr id="166" name="Google Shape;166;g388e2ef6367_9_3"/>
           <p:cNvSpPr txBox="1"/>
           <p:nvPr/>
         </p:nvSpPr>
@@ -16726,43 +17784,16 @@
           </a:p>
         </p:txBody>
       </p:sp>
-    </p:spTree>
-  </p:cSld>
-  <p:clrMapOvr>
-    <a:masterClrMapping/>
-  </p:clrMapOvr>
-</p:sld>
-</file>
-
-<file path=ppt/slides/slide9.xml><?xml version="1.0" encoding="utf-8"?>
-<p:sld xmlns:a="http://schemas.openxmlformats.org/drawingml/2006/main" xmlns:r="http://schemas.openxmlformats.org/officeDocument/2006/relationships" xmlns:mc="http://schemas.openxmlformats.org/markup-compatibility/2006" xmlns:mv="urn:schemas-microsoft-com:mac:vml" xmlns:p="http://schemas.openxmlformats.org/presentationml/2006/main" xmlns:c="http://schemas.openxmlformats.org/drawingml/2006/chart" xmlns:dgm="http://schemas.openxmlformats.org/drawingml/2006/diagram" xmlns:o="urn:schemas-microsoft-com:office:office" xmlns:v="urn:schemas-microsoft-com:vml" xmlns:pvml="urn:schemas-microsoft-com:office:powerpoint" xmlns:com="http://schemas.openxmlformats.org/drawingml/2006/compatibility" xmlns:p14="http://schemas.microsoft.com/office/powerpoint/2010/main" xmlns:p15="http://schemas.microsoft.com/office/powerpoint/2012/main" xmlns:ahyp="http://schemas.microsoft.com/office/drawing/2018/hyperlinkcolor">
-  <p:cSld>
-    <p:spTree>
-      <p:nvGrpSpPr>
-        <p:cNvPr id="159" name="Shape 159"/>
-        <p:cNvGrpSpPr/>
-        <p:nvPr/>
-      </p:nvGrpSpPr>
-      <p:grpSpPr>
-        <a:xfrm>
-          <a:off x="0" y="0"/>
-          <a:ext cx="0" cy="0"/>
-          <a:chOff x="0" y="0"/>
-          <a:chExt cx="0" cy="0"/>
-        </a:xfrm>
-      </p:grpSpPr>
       <p:sp>
         <p:nvSpPr>
-          <p:cNvPr id="160" name="Google Shape;160;p7"/>
+          <p:cNvPr id="167" name="Google Shape;167;g388e2ef6367_9_3"/>
           <p:cNvSpPr txBox="1"/>
-          <p:nvPr>
-            <p:ph type="title"/>
-          </p:nvPr>
+          <p:nvPr/>
         </p:nvSpPr>
         <p:spPr>
           <a:xfrm>
-            <a:off x="838200" y="365125"/>
-            <a:ext cx="10515600" cy="1325563"/>
+            <a:off x="740833" y="6138325"/>
+            <a:ext cx="6191400" cy="677100"/>
           </a:xfrm>
           <a:prstGeom prst="rect">
             <a:avLst/>
@@ -16773,190 +17804,33 @@
           </a:ln>
         </p:spPr>
         <p:txBody>
-          <a:bodyPr anchorCtr="0" anchor="ctr" bIns="45700" lIns="91425" spcFirstLastPara="1" rIns="91425" wrap="square" tIns="45700">
-            <a:normAutofit/>
+          <a:bodyPr anchorCtr="0" anchor="t" bIns="91425" lIns="91425" spcFirstLastPara="1" rIns="91425" wrap="square" tIns="91425">
+            <a:spAutoFit/>
           </a:bodyPr>
           <a:lstStyle/>
           <a:p>
-            <a:pPr indent="0" lvl="0" marL="0" rtl="0" algn="l">
-              <a:lnSpc>
-                <a:spcPct val="90000"/>
-              </a:lnSpc>
-              <a:spcBef>
-                <a:spcPts val="0"/>
-              </a:spcBef>
-              <a:spcAft>
-                <a:spcPts val="0"/>
-              </a:spcAft>
-              <a:buClr>
-                <a:schemeClr val="dk1"/>
-              </a:buClr>
-              <a:buSzPts val="4400"/>
-              <a:buFont typeface="Play"/>
+            <a:pPr indent="0" lvl="0" marL="0" rtl="0" algn="ctr">
+              <a:spcBef>
+                <a:spcPts val="0"/>
+              </a:spcBef>
+              <a:spcAft>
+                <a:spcPts val="0"/>
+              </a:spcAft>
               <a:buNone/>
             </a:pPr>
             <a:r>
-              <a:rPr lang="en-US"/>
-              <a:t>Future Directions</a:t>
+              <a:rPr lang="en-US" sz="1600">
+                <a:solidFill>
+                  <a:schemeClr val="dk1"/>
+                </a:solidFill>
+              </a:rPr>
+              <a:t>Induced subgraph of KG (CIViC, subsets of MSigSB, and GTEx co-expression</a:t>
             </a:r>
-            <a:endParaRPr/>
-          </a:p>
-        </p:txBody>
-      </p:sp>
-      <p:sp>
-        <p:nvSpPr>
-          <p:cNvPr id="161" name="Google Shape;161;p7"/>
-          <p:cNvSpPr txBox="1"/>
-          <p:nvPr>
-            <p:ph idx="1" type="body"/>
-          </p:nvPr>
-        </p:nvSpPr>
-        <p:spPr>
-          <a:xfrm>
-            <a:off x="838200" y="1825625"/>
-            <a:ext cx="10515600" cy="4351200"/>
-          </a:xfrm>
-          <a:prstGeom prst="rect">
-            <a:avLst/>
-          </a:prstGeom>
-          <a:noFill/>
-          <a:ln>
-            <a:noFill/>
-          </a:ln>
-        </p:spPr>
-        <p:txBody>
-          <a:bodyPr anchorCtr="0" anchor="t" bIns="45700" lIns="91425" spcFirstLastPara="1" rIns="91425" wrap="square" tIns="45700">
-            <a:normAutofit/>
-          </a:bodyPr>
-          <a:lstStyle/>
-          <a:p>
-            <a:pPr indent="-361950" lvl="0" marL="457200" rtl="0" algn="l">
-              <a:lnSpc>
-                <a:spcPct val="115000"/>
-              </a:lnSpc>
-              <a:spcBef>
-                <a:spcPts val="0"/>
-              </a:spcBef>
-              <a:spcAft>
-                <a:spcPts val="0"/>
-              </a:spcAft>
-              <a:buSzPts val="2100"/>
-              <a:buChar char="•"/>
-            </a:pPr>
-            <a:r>
-              <a:rPr lang="en-US" sz="2100" u="sng">
-                <a:solidFill>
-                  <a:srgbClr val="1155CC"/>
-                </a:solidFill>
-                <a:hlinkClick r:id="rId4">
-                  <a:extLst>
-                    <a:ext uri="{A12FA001-AC4F-418D-AE19-62706E023703}">
-                      <ahyp:hlinkClr val="tx"/>
-                    </a:ext>
-                  </a:extLst>
-                </a:hlinkClick>
-              </a:rPr>
-              <a:t>ClinicalTrials.gov</a:t>
-            </a:r>
-            <a:r>
-              <a:rPr lang="en-US" sz="2100"/>
-              <a:t> integration</a:t>
-            </a:r>
-            <a:endParaRPr sz="2100"/>
-          </a:p>
-          <a:p>
-            <a:pPr indent="-361950" lvl="0" marL="457200" rtl="0" algn="l">
-              <a:lnSpc>
-                <a:spcPct val="115000"/>
-              </a:lnSpc>
-              <a:spcBef>
-                <a:spcPts val="0"/>
-              </a:spcBef>
-              <a:spcAft>
-                <a:spcPts val="0"/>
-              </a:spcAft>
-              <a:buSzPts val="2100"/>
-              <a:buChar char="•"/>
-            </a:pPr>
-            <a:r>
-              <a:rPr lang="en-US" sz="2100"/>
-              <a:t>Add new data layers such as CNAs, gene fusions, drug sensitivity screens</a:t>
-            </a:r>
-            <a:endParaRPr sz="2100"/>
-          </a:p>
-          <a:p>
-            <a:pPr indent="-361950" lvl="0" marL="457200" rtl="0" algn="l">
-              <a:lnSpc>
-                <a:spcPct val="115000"/>
-              </a:lnSpc>
-              <a:spcBef>
-                <a:spcPts val="0"/>
-              </a:spcBef>
-              <a:spcAft>
-                <a:spcPts val="0"/>
-              </a:spcAft>
-              <a:buSzPts val="2100"/>
-              <a:buChar char="•"/>
-            </a:pPr>
-            <a:r>
-              <a:rPr lang="en-US" sz="2100"/>
-              <a:t>Graph neural networks could predict novel drug-gene associations</a:t>
-            </a:r>
-            <a:endParaRPr sz="2100"/>
-          </a:p>
-          <a:p>
-            <a:pPr indent="-361950" lvl="0" marL="457200" rtl="0" algn="l">
-              <a:lnSpc>
-                <a:spcPct val="115000"/>
-              </a:lnSpc>
-              <a:spcBef>
-                <a:spcPts val="0"/>
-              </a:spcBef>
-              <a:spcAft>
-                <a:spcPts val="0"/>
-              </a:spcAft>
-              <a:buSzPts val="2100"/>
-              <a:buChar char="•"/>
-            </a:pPr>
-            <a:r>
-              <a:rPr lang="en-US" sz="2100"/>
-              <a:t>Expand beyond cancer to include off-label therapeutic indications</a:t>
-            </a:r>
-            <a:endParaRPr sz="2100"/>
-          </a:p>
-          <a:p>
-            <a:pPr indent="-361950" lvl="0" marL="457200" rtl="0" algn="l">
-              <a:lnSpc>
-                <a:spcPct val="115000"/>
-              </a:lnSpc>
-              <a:spcBef>
-                <a:spcPts val="0"/>
-              </a:spcBef>
-              <a:spcAft>
-                <a:spcPts val="0"/>
-              </a:spcAft>
-              <a:buSzPts val="2100"/>
-              <a:buChar char="•"/>
-            </a:pPr>
-            <a:r>
-              <a:rPr lang="en-US" sz="2100"/>
-              <a:t>Integrate </a:t>
-            </a:r>
-            <a:r>
-              <a:rPr lang="en-US" sz="2100">
-                <a:extLst>
-                  <a:ext uri="http://customooxmlschemas.google.com/">
-                    <go:slidesCustomData xmlns:go="http://customooxmlschemas.google.com/" textRoundtripDataId="0"/>
-                  </a:ext>
-                </a:extLst>
-              </a:rPr>
-              <a:t>gene-based GWAS</a:t>
-            </a:r>
-            <a:r>
-              <a:rPr lang="en-US" sz="2100"/>
-              <a:t> to find new targets</a:t>
-            </a:r>
-            <a:endParaRPr sz="2100"/>
+            <a:endParaRPr sz="1600">
+              <a:solidFill>
+                <a:schemeClr val="dk1"/>
+              </a:solidFill>
+            </a:endParaRPr>
           </a:p>
         </p:txBody>
       </p:sp>

</xml_diff>